<commit_message>
UseCase diagram progress + proposal progress
</commit_message>
<xml_diff>
--- a/070_presentation/CarlonRiccardiElOurrak_ProjectDesignPresentation.pptx
+++ b/070_presentation/CarlonRiccardiElOurrak_ProjectDesignPresentation.pptx
@@ -225,7 +225,7 @@
           <a:p>
             <a:fld id="{0EF95162-6873-F647-B392-BF6A1F606277}" type="datetimeFigureOut">
               <a:rPr lang="it-IT" smtClean="0"/>
-              <a:t>19/06/2024</a:t>
+              <a:t>20/06/2024</a:t>
             </a:fld>
             <a:endParaRPr lang="it-IT"/>
           </a:p>
@@ -763,7 +763,7 @@
           <a:p>
             <a:fld id="{2FDCBEE4-315A-8E42-835E-29A1DAE07625}" type="datetimeFigureOut">
               <a:rPr lang="it-IT" smtClean="0"/>
-              <a:t>19/06/2024</a:t>
+              <a:t>20/06/2024</a:t>
             </a:fld>
             <a:endParaRPr lang="it-IT"/>
           </a:p>
@@ -955,7 +955,7 @@
           <a:p>
             <a:fld id="{2FDCBEE4-315A-8E42-835E-29A1DAE07625}" type="datetimeFigureOut">
               <a:rPr lang="it-IT" smtClean="0"/>
-              <a:t>19/06/2024</a:t>
+              <a:t>20/06/2024</a:t>
             </a:fld>
             <a:endParaRPr lang="it-IT"/>
           </a:p>
@@ -1157,7 +1157,7 @@
           <a:p>
             <a:fld id="{2FDCBEE4-315A-8E42-835E-29A1DAE07625}" type="datetimeFigureOut">
               <a:rPr lang="it-IT" smtClean="0"/>
-              <a:t>19/06/2024</a:t>
+              <a:t>20/06/2024</a:t>
             </a:fld>
             <a:endParaRPr lang="it-IT"/>
           </a:p>
@@ -1349,7 +1349,7 @@
           <a:p>
             <a:fld id="{2FDCBEE4-315A-8E42-835E-29A1DAE07625}" type="datetimeFigureOut">
               <a:rPr lang="it-IT" smtClean="0"/>
-              <a:t>19/06/2024</a:t>
+              <a:t>20/06/2024</a:t>
             </a:fld>
             <a:endParaRPr lang="it-IT"/>
           </a:p>
@@ -1618,7 +1618,7 @@
           <a:p>
             <a:fld id="{2FDCBEE4-315A-8E42-835E-29A1DAE07625}" type="datetimeFigureOut">
               <a:rPr lang="it-IT" smtClean="0"/>
-              <a:t>19/06/2024</a:t>
+              <a:t>20/06/2024</a:t>
             </a:fld>
             <a:endParaRPr lang="it-IT"/>
           </a:p>
@@ -1927,7 +1927,7 @@
           <a:p>
             <a:fld id="{2FDCBEE4-315A-8E42-835E-29A1DAE07625}" type="datetimeFigureOut">
               <a:rPr lang="it-IT" smtClean="0"/>
-              <a:t>19/06/2024</a:t>
+              <a:t>20/06/2024</a:t>
             </a:fld>
             <a:endParaRPr lang="it-IT"/>
           </a:p>
@@ -2370,7 +2370,7 @@
           <a:p>
             <a:fld id="{2FDCBEE4-315A-8E42-835E-29A1DAE07625}" type="datetimeFigureOut">
               <a:rPr lang="it-IT" smtClean="0"/>
-              <a:t>19/06/2024</a:t>
+              <a:t>20/06/2024</a:t>
             </a:fld>
             <a:endParaRPr lang="it-IT"/>
           </a:p>
@@ -2511,7 +2511,7 @@
           <a:p>
             <a:fld id="{2FDCBEE4-315A-8E42-835E-29A1DAE07625}" type="datetimeFigureOut">
               <a:rPr lang="it-IT" smtClean="0"/>
-              <a:t>19/06/2024</a:t>
+              <a:t>20/06/2024</a:t>
             </a:fld>
             <a:endParaRPr lang="it-IT"/>
           </a:p>
@@ -2630,7 +2630,7 @@
           <a:p>
             <a:fld id="{2FDCBEE4-315A-8E42-835E-29A1DAE07625}" type="datetimeFigureOut">
               <a:rPr lang="it-IT" smtClean="0"/>
-              <a:t>19/06/2024</a:t>
+              <a:t>20/06/2024</a:t>
             </a:fld>
             <a:endParaRPr lang="it-IT"/>
           </a:p>
@@ -2929,7 +2929,7 @@
           <a:p>
             <a:fld id="{2FDCBEE4-315A-8E42-835E-29A1DAE07625}" type="datetimeFigureOut">
               <a:rPr lang="it-IT" smtClean="0"/>
-              <a:t>19/06/2024</a:t>
+              <a:t>20/06/2024</a:t>
             </a:fld>
             <a:endParaRPr lang="it-IT"/>
           </a:p>
@@ -3205,7 +3205,7 @@
           <a:p>
             <a:fld id="{2FDCBEE4-315A-8E42-835E-29A1DAE07625}" type="datetimeFigureOut">
               <a:rPr lang="it-IT" smtClean="0"/>
-              <a:t>19/06/2024</a:t>
+              <a:t>20/06/2024</a:t>
             </a:fld>
             <a:endParaRPr lang="it-IT"/>
           </a:p>
@@ -4381,20 +4381,69 @@
             <p:ph type="title"/>
           </p:nvPr>
         </p:nvSpPr>
-        <p:spPr/>
+        <p:spPr>
+          <a:xfrm>
+            <a:off x="1" y="0"/>
+            <a:ext cx="2444375" cy="4386729"/>
+          </a:xfrm>
+        </p:spPr>
         <p:txBody>
           <a:bodyPr>
-            <a:normAutofit fontScale="90000"/>
+            <a:normAutofit/>
           </a:bodyPr>
           <a:lstStyle/>
           <a:p>
             <a:r>
-              <a:rPr lang="en-US" dirty="0"/>
-              <a:t>Actors and main supported functionalities</a:t>
-            </a:r>
-          </a:p>
-        </p:txBody>
-      </p:sp>
+              <a:rPr lang="en-US" sz="2800" b="1" dirty="0"/>
+              <a:t>Actors </a:t>
+            </a:r>
+            <a:br>
+              <a:rPr lang="en-US" sz="2800" dirty="0"/>
+            </a:br>
+            <a:r>
+              <a:rPr lang="en-US" sz="2800" dirty="0"/>
+              <a:t>and </a:t>
+            </a:r>
+            <a:br>
+              <a:rPr lang="en-US" sz="2800" dirty="0"/>
+            </a:br>
+            <a:r>
+              <a:rPr lang="en-US" sz="2800" b="1" dirty="0"/>
+              <a:t>main supported functionalities</a:t>
+            </a:r>
+          </a:p>
+        </p:txBody>
+      </p:sp>
+      <p:pic>
+        <p:nvPicPr>
+          <p:cNvPr id="4" name="Picture 3" descr="A screenshot of a computer screen&#10;&#10;Description automatically generated">
+            <a:extLst>
+              <a:ext uri="{FF2B5EF4-FFF2-40B4-BE49-F238E27FC236}">
+                <a16:creationId xmlns:a16="http://schemas.microsoft.com/office/drawing/2014/main" id="{884AD706-5874-6902-771D-CC3CACBB7ADE}"/>
+              </a:ext>
+            </a:extLst>
+          </p:cNvPr>
+          <p:cNvPicPr>
+            <a:picLocks noChangeAspect="1"/>
+          </p:cNvPicPr>
+          <p:nvPr/>
+        </p:nvPicPr>
+        <p:blipFill>
+          <a:blip r:embed="rId2"/>
+          <a:stretch>
+            <a:fillRect/>
+          </a:stretch>
+        </p:blipFill>
+        <p:spPr>
+          <a:xfrm>
+            <a:off x="2777594" y="0"/>
+            <a:ext cx="6366406" cy="6317129"/>
+          </a:xfrm>
+          <a:prstGeom prst="rect">
+            <a:avLst/>
+          </a:prstGeom>
+        </p:spPr>
+      </p:pic>
     </p:spTree>
     <p:extLst>
       <p:ext uri="{BB962C8B-B14F-4D97-AF65-F5344CB8AC3E}">

</xml_diff>

<commit_message>
data progress + topology
</commit_message>
<xml_diff>
--- a/070_presentation/CarlonRiccardiElOurrak_ProjectDesignPresentation.pptx
+++ b/070_presentation/CarlonRiccardiElOurrak_ProjectDesignPresentation.pptx
@@ -4384,7 +4384,7 @@
         <p:spPr>
           <a:xfrm>
             <a:off x="1" y="0"/>
-            <a:ext cx="2444375" cy="4386729"/>
+            <a:ext cx="2605740" cy="4386729"/>
           </a:xfrm>
         </p:spPr>
         <p:txBody>
@@ -4416,10 +4416,10 @@
       </p:sp>
       <p:pic>
         <p:nvPicPr>
-          <p:cNvPr id="4" name="Picture 3" descr="A screenshot of a computer screen&#10;&#10;Description automatically generated">
+          <p:cNvPr id="5" name="Picture 4" descr="A screenshot of a computer screen&#10;&#10;Description automatically generated">
             <a:extLst>
               <a:ext uri="{FF2B5EF4-FFF2-40B4-BE49-F238E27FC236}">
-                <a16:creationId xmlns:a16="http://schemas.microsoft.com/office/drawing/2014/main" id="{884AD706-5874-6902-771D-CC3CACBB7ADE}"/>
+                <a16:creationId xmlns:a16="http://schemas.microsoft.com/office/drawing/2014/main" id="{B9D8CE39-E3C6-F951-5F6F-F86D2D82C802}"/>
               </a:ext>
             </a:extLst>
           </p:cNvPr>
@@ -4436,8 +4436,8 @@
         </p:blipFill>
         <p:spPr>
           <a:xfrm>
-            <a:off x="2777594" y="0"/>
-            <a:ext cx="6366406" cy="6317129"/>
+            <a:off x="2766840" y="0"/>
+            <a:ext cx="6377159" cy="6858000"/>
           </a:xfrm>
           <a:prstGeom prst="rect">
             <a:avLst/>
@@ -4524,7 +4524,7 @@
         <p:spPr>
           <a:xfrm>
             <a:off x="397485" y="933746"/>
-            <a:ext cx="8349029" cy="5078313"/>
+            <a:ext cx="8349029" cy="6124754"/>
           </a:xfrm>
           <a:prstGeom prst="rect">
             <a:avLst/>
@@ -4539,32 +4539,154 @@
           <a:p>
             <a:pPr lvl="0"/>
             <a:r>
-              <a:rPr lang="en-US" b="1" i="1" dirty="0"/>
+              <a:rPr lang="en-US" sz="1400" b="1" i="1" dirty="0"/>
               <a:t>Source: </a:t>
             </a:r>
           </a:p>
           <a:p>
+            <a:pPr marL="285750" lvl="0" indent="-285750">
+              <a:buFont typeface="Arial" panose="020B0604020202020204" pitchFamily="34" charset="0"/>
+              <a:buChar char="•"/>
+            </a:pPr>
+            <a:r>
+              <a:rPr lang="en-US" sz="1400" b="1" i="1" dirty="0">
+                <a:hlinkClick r:id="rId2"/>
+              </a:rPr>
+              <a:t>https://myanimelist.net/</a:t>
+            </a:r>
+            <a:r>
+              <a:rPr lang="en-US" sz="1400" b="1" i="1" dirty="0"/>
+              <a:t> (</a:t>
+            </a:r>
+            <a:r>
+              <a:rPr lang="en-US" sz="1400" b="1" i="1" dirty="0" err="1"/>
+              <a:t>anime_info</a:t>
+            </a:r>
+            <a:r>
+              <a:rPr lang="en-US" sz="1400" b="1" i="1" dirty="0"/>
+              <a:t>, </a:t>
+            </a:r>
+            <a:r>
+              <a:rPr lang="en-US" sz="1400" b="1" i="1" dirty="0" err="1"/>
+              <a:t>user_anime_lists</a:t>
+            </a:r>
+            <a:r>
+              <a:rPr lang="en-US" sz="1400" b="1" i="1" dirty="0"/>
+              <a:t>, user data) </a:t>
+            </a:r>
+          </a:p>
+          <a:p>
+            <a:pPr marL="285750" lvl="0" indent="-285750">
+              <a:buFont typeface="Arial" panose="020B0604020202020204" pitchFamily="34" charset="0"/>
+              <a:buChar char="•"/>
+            </a:pPr>
+            <a:r>
+              <a:rPr lang="en-US" sz="1400" b="1" i="1" dirty="0">
+                <a:hlinkClick r:id="rId3"/>
+              </a:rPr>
+              <a:t>https://sourceforge.net/projects/anime-offline-database.mirror/</a:t>
+            </a:r>
+            <a:r>
+              <a:rPr lang="en-US" sz="1400" b="1" i="1" dirty="0"/>
+              <a:t> (</a:t>
+            </a:r>
+            <a:r>
+              <a:rPr lang="en-US" sz="1400" b="1" i="1" dirty="0" err="1"/>
+              <a:t>anime_info</a:t>
+            </a:r>
+            <a:r>
+              <a:rPr lang="en-US" sz="1400" b="1" i="1" dirty="0"/>
+              <a:t>, images)</a:t>
+            </a:r>
+          </a:p>
+          <a:p>
+            <a:pPr marL="285750" indent="-285750">
+              <a:buFont typeface="Arial" panose="020B0604020202020204" pitchFamily="34" charset="0"/>
+              <a:buChar char="•"/>
+            </a:pPr>
+            <a:r>
+              <a:rPr lang="en-US" sz="1400" b="1" i="1" dirty="0">
+                <a:hlinkClick r:id="rId4"/>
+              </a:rPr>
+              <a:t>https://www.name-generator.org.uk/quick/</a:t>
+            </a:r>
+            <a:r>
+              <a:rPr lang="en-US" sz="1400" b="1" i="1" dirty="0"/>
+              <a:t> (user data)</a:t>
+            </a:r>
+          </a:p>
+          <a:p>
+            <a:pPr marL="285750" indent="-285750">
+              <a:buFont typeface="Arial" panose="020B0604020202020204" pitchFamily="34" charset="0"/>
+              <a:buChar char="•"/>
+            </a:pPr>
+            <a:r>
+              <a:rPr lang="en-US" sz="1400" b="1" i="1" dirty="0">
+                <a:hlinkClick r:id="rId5"/>
+              </a:rPr>
+              <a:t>https://1000randomnames.com/</a:t>
+            </a:r>
+            <a:r>
+              <a:rPr lang="en-US" sz="1400" b="1" i="1" dirty="0"/>
+              <a:t> (user data)</a:t>
+            </a:r>
+          </a:p>
+          <a:p>
+            <a:pPr marL="285750" indent="-285750">
+              <a:buFont typeface="Arial" panose="020B0604020202020204" pitchFamily="34" charset="0"/>
+              <a:buChar char="•"/>
+            </a:pPr>
+            <a:endParaRPr lang="en-US" sz="1400" b="1" i="1" dirty="0"/>
+          </a:p>
+          <a:p>
+            <a:pPr marL="285750" lvl="0" indent="-285750">
+              <a:buFontTx/>
+              <a:buChar char="-"/>
+            </a:pPr>
+            <a:endParaRPr lang="en-US" sz="1400" b="1" i="1" dirty="0"/>
+          </a:p>
+          <a:p>
             <a:pPr lvl="0"/>
-            <a:r>
-              <a:rPr lang="en-US" b="1" i="1" dirty="0"/>
-              <a:t>-	https://myanimelist.net/</a:t>
-            </a:r>
+            <a:endParaRPr lang="en-US" sz="1400" b="1" i="1" dirty="0"/>
           </a:p>
           <a:p>
             <a:pPr lvl="0"/>
             <a:r>
-              <a:rPr lang="en-US" b="1" i="1" dirty="0"/>
-              <a:t>-	https://www.name-generator.org.uk/quick/ Description:</a:t>
+              <a:rPr lang="en-US" sz="1400" b="1" i="1" dirty="0"/>
+              <a:t>Description:</a:t>
             </a:r>
           </a:p>
           <a:p>
             <a:pPr lvl="0"/>
-            <a:endParaRPr lang="en-US" dirty="0"/>
+            <a:r>
+              <a:rPr lang="en-US" sz="1400" dirty="0"/>
+              <a:t>Dataset contains real anime and users information, as well as list of anime per user.</a:t>
+            </a:r>
           </a:p>
           <a:p>
             <a:pPr lvl="0"/>
             <a:r>
-              <a:rPr lang="en-US" dirty="0"/>
+              <a:rPr lang="en-US" sz="1400" dirty="0"/>
+              <a:t>The name/surname of the users are randomly generated.</a:t>
+            </a:r>
+            <a:endParaRPr lang="en-US" sz="1400" b="1" i="1" dirty="0"/>
+          </a:p>
+          <a:p>
+            <a:pPr lvl="0"/>
+            <a:endParaRPr lang="en-US" sz="1400" b="1" i="1" dirty="0"/>
+          </a:p>
+          <a:p>
+            <a:pPr lvl="0"/>
+            <a:r>
+              <a:rPr lang="en-US" sz="1400" b="1" i="1" dirty="0"/>
+              <a:t>Volume:</a:t>
+            </a:r>
+            <a:endParaRPr lang="en-US" sz="1400" dirty="0"/>
+          </a:p>
+          <a:p>
+            <a:pPr lvl="0"/>
+            <a:r>
+              <a:rPr lang="en-US" sz="1400" dirty="0"/>
               <a:t>The scraped dataset has three .csv files: </a:t>
             </a:r>
           </a:p>
@@ -4574,10 +4696,17 @@
               <a:buChar char="-"/>
             </a:pPr>
             <a:r>
-              <a:rPr lang="en-US" dirty="0" err="1"/>
-              <a:t>User_data</a:t>
-            </a:r>
-            <a:endParaRPr lang="en-US" dirty="0"/>
+              <a:rPr lang="en-US" sz="1400" dirty="0" err="1"/>
+              <a:t>User_List</a:t>
+            </a:r>
+            <a:r>
+              <a:rPr lang="en-US" sz="1400" dirty="0"/>
+              <a:t> : </a:t>
+            </a:r>
+            <a:r>
+              <a:rPr lang="en-US" sz="1400" b="1" dirty="0"/>
+              <a:t>15.75 MB</a:t>
+            </a:r>
           </a:p>
           <a:p>
             <a:pPr marL="342900" lvl="0" indent="-342900">
@@ -4585,10 +4714,17 @@
               <a:buChar char="-"/>
             </a:pPr>
             <a:r>
-              <a:rPr lang="en-US" dirty="0" err="1"/>
+              <a:rPr lang="en-US" sz="1400" dirty="0" err="1"/>
               <a:t>Anime_details</a:t>
             </a:r>
-            <a:endParaRPr lang="en-US" dirty="0"/>
+            <a:r>
+              <a:rPr lang="en-US" sz="1400" dirty="0"/>
+              <a:t> : </a:t>
+            </a:r>
+            <a:r>
+              <a:rPr lang="en-US" sz="1400" b="1" dirty="0"/>
+              <a:t>6.33 MB</a:t>
+            </a:r>
           </a:p>
           <a:p>
             <a:pPr marL="342900" lvl="0" indent="-342900">
@@ -4596,68 +4732,80 @@
               <a:buChar char="-"/>
             </a:pPr>
             <a:r>
-              <a:rPr lang="en-US" dirty="0"/>
-              <a:t>List of anime for each user</a:t>
-            </a:r>
+              <a:rPr lang="en-US" sz="1400" dirty="0"/>
+              <a:t>List of anime for each user : </a:t>
+            </a:r>
+            <a:r>
+              <a:rPr lang="en-US" sz="1400" b="1" dirty="0"/>
+              <a:t>2.26 GB</a:t>
+            </a:r>
+          </a:p>
+          <a:p>
+            <a:pPr marL="342900" lvl="0" indent="-342900">
+              <a:buFontTx/>
+              <a:buChar char="-"/>
+            </a:pPr>
+            <a:r>
+              <a:rPr lang="en-US" sz="1400" dirty="0" err="1"/>
+              <a:t>Anime_info</a:t>
+            </a:r>
+            <a:r>
+              <a:rPr lang="en-US" sz="1400" dirty="0"/>
+              <a:t> and images : 47.3 MB</a:t>
+            </a:r>
+          </a:p>
+          <a:p>
+            <a:pPr marL="342900" lvl="0" indent="-342900">
+              <a:buFontTx/>
+              <a:buChar char="-"/>
+            </a:pPr>
+            <a:r>
+              <a:rPr lang="en-US" sz="1400" dirty="0"/>
+              <a:t>a</a:t>
+            </a:r>
+          </a:p>
+          <a:p>
+            <a:pPr marL="342900" lvl="0" indent="-342900">
+              <a:buFontTx/>
+              <a:buChar char="-"/>
+            </a:pPr>
+            <a:endParaRPr lang="en-US" sz="1400" b="1" dirty="0"/>
           </a:p>
           <a:p>
             <a:pPr lvl="0"/>
-            <a:endParaRPr lang="en-US" b="1" i="1" dirty="0"/>
+            <a:endParaRPr lang="en-US" sz="1400" b="1" i="1" dirty="0"/>
           </a:p>
           <a:p>
             <a:pPr lvl="0"/>
             <a:r>
-              <a:rPr lang="en-US" b="1" i="1" dirty="0"/>
-              <a:t>Volume:</a:t>
+              <a:rPr lang="en-US" sz="1400" dirty="0"/>
+              <a:t>The initial volume of the scraped DB was about 2.5GB</a:t>
             </a:r>
           </a:p>
           <a:p>
             <a:pPr lvl="0"/>
-            <a:r>
-              <a:rPr lang="en-US" dirty="0"/>
-              <a:t>The initial volume of the scraped DB was about 2.5GB</a:t>
-            </a:r>
+            <a:endParaRPr lang="en-US" sz="1400" b="1" i="1" dirty="0"/>
           </a:p>
           <a:p>
             <a:pPr lvl="0"/>
-            <a:endParaRPr lang="en-US" b="1" i="1" dirty="0"/>
+            <a:r>
+              <a:rPr lang="en-US" sz="1400" b="1" i="1" dirty="0"/>
+              <a:t>Variety</a:t>
+            </a:r>
+            <a:r>
+              <a:rPr lang="en-US" sz="1400" dirty="0"/>
+              <a:t>: </a:t>
+            </a:r>
           </a:p>
           <a:p>
             <a:pPr lvl="0"/>
             <a:r>
-              <a:rPr lang="en-US" b="1" i="1" dirty="0"/>
-              <a:t>Variety</a:t>
-            </a:r>
-            <a:r>
-              <a:rPr lang="en-US" dirty="0"/>
-              <a:t>: </a:t>
-            </a:r>
-          </a:p>
-          <a:p>
-            <a:pPr lvl="0"/>
-            <a:r>
-              <a:rPr lang="en-US" dirty="0"/>
+              <a:rPr lang="en-US" sz="1400" dirty="0"/>
               <a:t>The data comes from the complete database of the original website, and have the same distribution as the real users</a:t>
             </a:r>
           </a:p>
           <a:p>
-            <a:pPr lvl="0"/>
-            <a:endParaRPr lang="en-US" b="1" i="1" dirty="0"/>
-          </a:p>
-          <a:p>
-            <a:pPr lvl="0"/>
-            <a:r>
-              <a:rPr lang="en-US" b="1" i="1" dirty="0"/>
-              <a:t>Velocity/Variability</a:t>
-            </a:r>
-            <a:r>
-              <a:rPr lang="en-US" dirty="0"/>
-              <a:t>:</a:t>
-            </a:r>
-            <a:endParaRPr lang="it-IT" dirty="0"/>
-          </a:p>
-          <a:p>
-            <a:endParaRPr lang="en-US" dirty="0"/>
+            <a:endParaRPr lang="en-US" sz="1400" dirty="0"/>
           </a:p>
         </p:txBody>
       </p:sp>
@@ -5050,6 +5198,36 @@
           </a:p>
         </p:txBody>
       </p:sp>
+      <p:pic>
+        <p:nvPicPr>
+          <p:cNvPr id="6" name="Picture 5" descr="A black and pink circle with black text&#10;&#10;Description automatically generated">
+            <a:extLst>
+              <a:ext uri="{FF2B5EF4-FFF2-40B4-BE49-F238E27FC236}">
+                <a16:creationId xmlns:a16="http://schemas.microsoft.com/office/drawing/2014/main" id="{CB56E956-B9B4-DFC8-B34E-96EC91E71431}"/>
+              </a:ext>
+            </a:extLst>
+          </p:cNvPr>
+          <p:cNvPicPr>
+            <a:picLocks noChangeAspect="1"/>
+          </p:cNvPicPr>
+          <p:nvPr/>
+        </p:nvPicPr>
+        <p:blipFill>
+          <a:blip r:embed="rId2"/>
+          <a:stretch>
+            <a:fillRect/>
+          </a:stretch>
+        </p:blipFill>
+        <p:spPr>
+          <a:xfrm>
+            <a:off x="4370387" y="1665568"/>
+            <a:ext cx="3857625" cy="1028700"/>
+          </a:xfrm>
+          <a:prstGeom prst="rect">
+            <a:avLst/>
+          </a:prstGeom>
+        </p:spPr>
+      </p:pic>
     </p:spTree>
     <p:extLst>
       <p:ext uri="{BB962C8B-B14F-4D97-AF65-F5344CB8AC3E}">

</xml_diff>